<commit_message>
Added grade counts for chart | Added Boy Counts for another page table | Added girl counts for anouther page table
</commit_message>
<xml_diff>
--- a/PROJECT PROPOSAL.pptx
+++ b/PROJECT PROPOSAL.pptx
@@ -8,12 +8,10 @@
     <p:sldId id="256" r:id="rId2"/>
     <p:sldId id="257" r:id="rId3"/>
     <p:sldId id="258" r:id="rId4"/>
-    <p:sldId id="264" r:id="rId5"/>
+    <p:sldId id="265" r:id="rId5"/>
     <p:sldId id="261" r:id="rId6"/>
-    <p:sldId id="259" r:id="rId7"/>
-    <p:sldId id="260" r:id="rId8"/>
-    <p:sldId id="262" r:id="rId9"/>
-    <p:sldId id="263" r:id="rId10"/>
+    <p:sldId id="260" r:id="rId7"/>
+    <p:sldId id="263" r:id="rId8"/>
   </p:sldIdLst>
   <p:sldSz cx="12192000" cy="6858000"/>
   <p:notesSz cx="6858000" cy="9144000"/>
@@ -112,6 +110,11 @@
       </a:defRPr>
     </a:lvl9pPr>
   </p:defaultTextStyle>
+  <p:extLst>
+    <p:ext uri="{EFAFB233-063F-42B5-8137-9DF3F51BA10A}">
+      <p15:sldGuideLst xmlns:p15="http://schemas.microsoft.com/office/powerpoint/2012/main"/>
+    </p:ext>
+  </p:extLst>
 </p:presentation>
 </file>
 
@@ -4391,7 +4394,7 @@
           <a:p>
             <a:fld id="{9DC0F180-7B37-4392-81AC-B68CD483E16F}" type="datetimeFigureOut">
               <a:rPr lang="en-US" smtClean="0"/>
-              <a:t>12/4/2023</a:t>
+              <a:t>1/26/2024</a:t>
             </a:fld>
             <a:endParaRPr lang="en-US"/>
           </a:p>
@@ -4658,7 +4661,7 @@
           <a:p>
             <a:fld id="{9DC0F180-7B37-4392-81AC-B68CD483E16F}" type="datetimeFigureOut">
               <a:rPr lang="en-US" smtClean="0"/>
-              <a:t>12/4/2023</a:t>
+              <a:t>1/26/2024</a:t>
             </a:fld>
             <a:endParaRPr lang="en-US"/>
           </a:p>
@@ -4854,7 +4857,7 @@
           <a:p>
             <a:fld id="{9DC0F180-7B37-4392-81AC-B68CD483E16F}" type="datetimeFigureOut">
               <a:rPr lang="en-US" smtClean="0"/>
-              <a:t>12/4/2023</a:t>
+              <a:t>1/26/2024</a:t>
             </a:fld>
             <a:endParaRPr lang="en-US"/>
           </a:p>
@@ -5117,7 +5120,7 @@
           <a:p>
             <a:fld id="{9DC0F180-7B37-4392-81AC-B68CD483E16F}" type="datetimeFigureOut">
               <a:rPr lang="en-US" smtClean="0"/>
-              <a:t>12/4/2023</a:t>
+              <a:t>1/26/2024</a:t>
             </a:fld>
             <a:endParaRPr lang="en-US"/>
           </a:p>
@@ -5551,7 +5554,7 @@
           <a:p>
             <a:fld id="{9DC0F180-7B37-4392-81AC-B68CD483E16F}" type="datetimeFigureOut">
               <a:rPr lang="en-US" smtClean="0"/>
-              <a:t>12/4/2023</a:t>
+              <a:t>1/26/2024</a:t>
             </a:fld>
             <a:endParaRPr lang="en-US"/>
           </a:p>
@@ -6097,7 +6100,7 @@
           <a:p>
             <a:fld id="{9DC0F180-7B37-4392-81AC-B68CD483E16F}" type="datetimeFigureOut">
               <a:rPr lang="en-US" smtClean="0"/>
-              <a:t>12/4/2023</a:t>
+              <a:t>1/26/2024</a:t>
             </a:fld>
             <a:endParaRPr lang="en-US"/>
           </a:p>
@@ -6817,7 +6820,7 @@
           <a:p>
             <a:fld id="{9DC0F180-7B37-4392-81AC-B68CD483E16F}" type="datetimeFigureOut">
               <a:rPr lang="en-US" smtClean="0"/>
-              <a:t>12/4/2023</a:t>
+              <a:t>1/26/2024</a:t>
             </a:fld>
             <a:endParaRPr lang="en-US"/>
           </a:p>
@@ -6987,7 +6990,7 @@
           <a:p>
             <a:fld id="{9DC0F180-7B37-4392-81AC-B68CD483E16F}" type="datetimeFigureOut">
               <a:rPr lang="en-US" smtClean="0"/>
-              <a:t>12/4/2023</a:t>
+              <a:t>1/26/2024</a:t>
             </a:fld>
             <a:endParaRPr lang="en-US"/>
           </a:p>
@@ -7167,7 +7170,7 @@
           <a:p>
             <a:fld id="{9DC0F180-7B37-4392-81AC-B68CD483E16F}" type="datetimeFigureOut">
               <a:rPr lang="en-US" smtClean="0"/>
-              <a:t>12/4/2023</a:t>
+              <a:t>1/26/2024</a:t>
             </a:fld>
             <a:endParaRPr lang="en-US"/>
           </a:p>
@@ -7337,7 +7340,7 @@
           <a:p>
             <a:fld id="{9DC0F180-7B37-4392-81AC-B68CD483E16F}" type="datetimeFigureOut">
               <a:rPr lang="en-US" smtClean="0"/>
-              <a:t>12/4/2023</a:t>
+              <a:t>1/26/2024</a:t>
             </a:fld>
             <a:endParaRPr lang="en-US"/>
           </a:p>
@@ -7587,7 +7590,7 @@
           <a:p>
             <a:fld id="{9DC0F180-7B37-4392-81AC-B68CD483E16F}" type="datetimeFigureOut">
               <a:rPr lang="en-US" smtClean="0"/>
-              <a:t>12/4/2023</a:t>
+              <a:t>1/26/2024</a:t>
             </a:fld>
             <a:endParaRPr lang="en-US"/>
           </a:p>
@@ -7819,7 +7822,7 @@
           <a:p>
             <a:fld id="{9DC0F180-7B37-4392-81AC-B68CD483E16F}" type="datetimeFigureOut">
               <a:rPr lang="en-US" smtClean="0"/>
-              <a:t>12/4/2023</a:t>
+              <a:t>1/26/2024</a:t>
             </a:fld>
             <a:endParaRPr lang="en-US"/>
           </a:p>
@@ -8200,7 +8203,7 @@
           <a:p>
             <a:fld id="{9DC0F180-7B37-4392-81AC-B68CD483E16F}" type="datetimeFigureOut">
               <a:rPr lang="en-US" smtClean="0"/>
-              <a:t>12/4/2023</a:t>
+              <a:t>1/26/2024</a:t>
             </a:fld>
             <a:endParaRPr lang="en-US"/>
           </a:p>
@@ -8318,7 +8321,7 @@
           <a:p>
             <a:fld id="{9DC0F180-7B37-4392-81AC-B68CD483E16F}" type="datetimeFigureOut">
               <a:rPr lang="en-US" smtClean="0"/>
-              <a:t>12/4/2023</a:t>
+              <a:t>1/26/2024</a:t>
             </a:fld>
             <a:endParaRPr lang="en-US"/>
           </a:p>
@@ -8413,7 +8416,7 @@
           <a:p>
             <a:fld id="{9DC0F180-7B37-4392-81AC-B68CD483E16F}" type="datetimeFigureOut">
               <a:rPr lang="en-US" smtClean="0"/>
-              <a:t>12/4/2023</a:t>
+              <a:t>1/26/2024</a:t>
             </a:fld>
             <a:endParaRPr lang="en-US"/>
           </a:p>
@@ -8662,7 +8665,7 @@
           <a:p>
             <a:fld id="{9DC0F180-7B37-4392-81AC-B68CD483E16F}" type="datetimeFigureOut">
               <a:rPr lang="en-US" smtClean="0"/>
-              <a:t>12/4/2023</a:t>
+              <a:t>1/26/2024</a:t>
             </a:fld>
             <a:endParaRPr lang="en-US"/>
           </a:p>
@@ -8942,7 +8945,7 @@
           <a:p>
             <a:fld id="{9DC0F180-7B37-4392-81AC-B68CD483E16F}" type="datetimeFigureOut">
               <a:rPr lang="en-US" smtClean="0"/>
-              <a:t>12/4/2023</a:t>
+              <a:t>1/26/2024</a:t>
             </a:fld>
             <a:endParaRPr lang="en-US"/>
           </a:p>
@@ -12019,7 +12022,7 @@
           <a:p>
             <a:fld id="{9DC0F180-7B37-4392-81AC-B68CD483E16F}" type="datetimeFigureOut">
               <a:rPr lang="en-US" smtClean="0"/>
-              <a:t>12/4/2023</a:t>
+              <a:t>1/26/2024</a:t>
             </a:fld>
             <a:endParaRPr lang="en-US"/>
           </a:p>
@@ -12458,13 +12461,13 @@
         <p:spPr/>
         <p:txBody>
           <a:bodyPr>
-            <a:normAutofit/>
+            <a:normAutofit fontScale="90000"/>
           </a:bodyPr>
           <a:lstStyle/>
           <a:p>
             <a:r>
               <a:rPr lang="en-US" sz="6000" dirty="0"/>
-              <a:t>PROJECT PROPOSAL</a:t>
+              <a:t>Revolutionizing Enrollment: An Online Solution</a:t>
             </a:r>
           </a:p>
         </p:txBody>
@@ -12492,7 +12495,7 @@
           <a:p>
             <a:r>
               <a:rPr lang="en-US" dirty="0"/>
-              <a:t>MP2 PRESENTATION</a:t>
+              <a:t>Wd89p - RENZ SAYAMAN</a:t>
             </a:r>
           </a:p>
         </p:txBody>
@@ -12586,7 +12589,19 @@
                 <a:effectLst/>
                 <a:latin typeface="Söhne"/>
               </a:rPr>
-              <a:t>In today's proposal, I am excited to present a Student Dashboard System designed to simplify administration tasks and enhance student management</a:t>
+              <a:t>In a rapidly evolving digital landscape, the Online Enrollment System for Elementary School is a critical solution for streamlining student enrollment and data management.</a:t>
+            </a:r>
+          </a:p>
+          <a:p>
+            <a:r>
+              <a:rPr lang="en-US" sz="2800" b="0" i="0" dirty="0">
+                <a:solidFill>
+                  <a:srgbClr val="D1D5DB"/>
+                </a:solidFill>
+                <a:effectLst/>
+                <a:latin typeface="Söhne"/>
+              </a:rPr>
+              <a:t>Using cutting-edge technologies, the system aims to improve efficiency and accuracy in handling student information.</a:t>
             </a:r>
             <a:endParaRPr lang="en-US" sz="2800" dirty="0"/>
           </a:p>
@@ -12645,7 +12660,7 @@
           <a:p>
             <a:r>
               <a:rPr lang="en-US" dirty="0"/>
-              <a:t>PROJECT OBJECTIVES</a:t>
+              <a:t>BACKGROUND &amp; CONTEXT</a:t>
             </a:r>
           </a:p>
         </p:txBody>
@@ -12668,7 +12683,9 @@
         </p:nvSpPr>
         <p:spPr/>
         <p:txBody>
-          <a:bodyPr/>
+          <a:bodyPr>
+            <a:normAutofit/>
+          </a:bodyPr>
           <a:lstStyle/>
           <a:p>
             <a:r>
@@ -12679,8 +12696,22 @@
                 <a:effectLst/>
                 <a:latin typeface="Söhne"/>
               </a:rPr>
-              <a:t>My project includes a secure registration and login system, an informative dashboard displaying student counts, a student registration page with automatic ID generation, and a profile page for admin management.</a:t>
+              <a:t>Manual data handling, paper-based record-keeping, and the potential for errors have underscored the need for a technological solution to streamline these operations.</a:t>
             </a:r>
+          </a:p>
+          <a:p>
+            <a:r>
+              <a:rPr lang="en-US" b="0" i="0" dirty="0">
+                <a:solidFill>
+                  <a:srgbClr val="D1D5DB"/>
+                </a:solidFill>
+                <a:effectLst/>
+                <a:latin typeface="Söhne"/>
+              </a:rPr>
+              <a:t>Providing essential context, the landscape of elementary school administration has witnessed significant challenges in traditional enrollment and data management processes.</a:t>
+            </a:r>
+          </a:p>
+          <a:p>
             <a:endParaRPr lang="en-US" dirty="0"/>
           </a:p>
         </p:txBody>
@@ -12715,46 +12746,113 @@
           <a:chExt cx="0" cy="0"/>
         </a:xfrm>
       </p:grpSpPr>
-      <p:pic>
-        <p:nvPicPr>
-          <p:cNvPr id="7" name="Picture 6">
+      <p:sp>
+        <p:nvSpPr>
+          <p:cNvPr id="2" name="Title 1">
             <a:extLst>
               <a:ext uri="{FF2B5EF4-FFF2-40B4-BE49-F238E27FC236}">
-                <a16:creationId xmlns:a16="http://schemas.microsoft.com/office/drawing/2014/main" id="{EE3970C2-A215-1F79-5A6C-E1EDEDD64636}"/>
+                <a16:creationId xmlns:a16="http://schemas.microsoft.com/office/drawing/2014/main" id="{A6F885C1-40F6-FFC9-F86D-037DAF110E7B}"/>
               </a:ext>
             </a:extLst>
           </p:cNvPr>
-          <p:cNvPicPr>
-            <a:picLocks noChangeAspect="1"/>
-          </p:cNvPicPr>
-          <p:nvPr/>
-        </p:nvPicPr>
-        <p:blipFill>
-          <a:blip r:embed="rId2">
+          <p:cNvSpPr>
+            <a:spLocks noGrp="1"/>
+          </p:cNvSpPr>
+          <p:nvPr>
+            <p:ph type="title"/>
+          </p:nvPr>
+        </p:nvSpPr>
+        <p:spPr/>
+        <p:txBody>
+          <a:bodyPr/>
+          <a:lstStyle/>
+          <a:p>
+            <a:r>
+              <a:rPr lang="en-US" dirty="0"/>
+              <a:t>SCOPES &amp; LIMITATIONS</a:t>
+            </a:r>
+          </a:p>
+        </p:txBody>
+      </p:sp>
+      <p:sp>
+        <p:nvSpPr>
+          <p:cNvPr id="3" name="Content Placeholder 2">
             <a:extLst>
-              <a:ext uri="{28A0092B-C50C-407E-A947-70E740481C1C}">
-                <a14:useLocalDpi xmlns:a14="http://schemas.microsoft.com/office/drawing/2010/main" val="0"/>
+              <a:ext uri="{FF2B5EF4-FFF2-40B4-BE49-F238E27FC236}">
+                <a16:creationId xmlns:a16="http://schemas.microsoft.com/office/drawing/2014/main" id="{F21E93D4-CD4B-9F70-B91F-DC32BDE35BD4}"/>
               </a:ext>
             </a:extLst>
-          </a:blip>
-          <a:stretch>
-            <a:fillRect/>
-          </a:stretch>
-        </p:blipFill>
-        <p:spPr>
-          <a:xfrm>
-            <a:off x="4105275" y="709612"/>
-            <a:ext cx="3981450" cy="5438775"/>
-          </a:xfrm>
-          <a:prstGeom prst="rect">
-            <a:avLst/>
-          </a:prstGeom>
-        </p:spPr>
-      </p:pic>
+          </p:cNvPr>
+          <p:cNvSpPr>
+            <a:spLocks noGrp="1"/>
+          </p:cNvSpPr>
+          <p:nvPr>
+            <p:ph idx="1"/>
+          </p:nvPr>
+        </p:nvSpPr>
+        <p:spPr/>
+        <p:txBody>
+          <a:bodyPr>
+            <a:normAutofit fontScale="92500" lnSpcReduction="10000"/>
+          </a:bodyPr>
+          <a:lstStyle/>
+          <a:p>
+            <a:r>
+              <a:rPr lang="en-US" b="0" i="0" dirty="0">
+                <a:solidFill>
+                  <a:srgbClr val="D1D5DB"/>
+                </a:solidFill>
+                <a:effectLst/>
+                <a:latin typeface="Söhne"/>
+              </a:rPr>
+              <a:t>Efficient Enrollment Process: The system streamlines the enrollment process, reducing the time and effort required for administrators.</a:t>
+            </a:r>
+          </a:p>
+          <a:p>
+            <a:r>
+              <a:rPr lang="en-US" b="0" i="0" dirty="0">
+                <a:solidFill>
+                  <a:srgbClr val="D1D5DB"/>
+                </a:solidFill>
+                <a:effectLst/>
+                <a:latin typeface="Söhne"/>
+              </a:rPr>
+              <a:t>Real-time Data: Administrators have real-time access to student demographic data, which allows them to make more informed decisions.</a:t>
+            </a:r>
+          </a:p>
+          <a:p>
+            <a:r>
+              <a:rPr lang="en-US" b="0" i="0" dirty="0">
+                <a:solidFill>
+                  <a:srgbClr val="D1D5DB"/>
+                </a:solidFill>
+                <a:effectLst/>
+                <a:latin typeface="Söhne"/>
+              </a:rPr>
+              <a:t>Internet Dependency: The system relies on a stable internet connection for optimal functionality.</a:t>
+            </a:r>
+          </a:p>
+          <a:p>
+            <a:r>
+              <a:rPr lang="en-US" b="0" i="0" dirty="0">
+                <a:solidFill>
+                  <a:srgbClr val="D1D5DB"/>
+                </a:solidFill>
+                <a:effectLst/>
+                <a:latin typeface="Söhne"/>
+              </a:rPr>
+              <a:t>Training Requirement: Users, particularly administrators, may require training to fully utilize the system's features.</a:t>
+            </a:r>
+          </a:p>
+          <a:p>
+            <a:endParaRPr lang="en-US" dirty="0"/>
+          </a:p>
+        </p:txBody>
+      </p:sp>
     </p:spTree>
     <p:extLst>
       <p:ext uri="{BB962C8B-B14F-4D97-AF65-F5344CB8AC3E}">
-        <p14:creationId xmlns:p14="http://schemas.microsoft.com/office/powerpoint/2010/main" val="1844012555"/>
+        <p14:creationId xmlns:p14="http://schemas.microsoft.com/office/powerpoint/2010/main" val="1219995392"/>
       </p:ext>
     </p:extLst>
   </p:cSld>
@@ -12804,7 +12902,7 @@
           <a:p>
             <a:r>
               <a:rPr lang="en-US" dirty="0"/>
-              <a:t>TARGET USERS</a:t>
+              <a:t>PROJECT METHODOLOGY</a:t>
             </a:r>
           </a:p>
         </p:txBody>
@@ -12835,16 +12933,6 @@
               <a:buChar char="•"/>
             </a:pPr>
             <a:r>
-              <a:rPr lang="en-US" b="0" i="1" dirty="0">
-                <a:solidFill>
-                  <a:srgbClr val="D1D5DB"/>
-                </a:solidFill>
-                <a:effectLst/>
-                <a:latin typeface="Söhne"/>
-              </a:rPr>
-              <a:t>Administrators and Staff:</a:t>
-            </a:r>
-            <a:r>
               <a:rPr lang="en-US" b="0" i="0" dirty="0">
                 <a:solidFill>
                   <a:srgbClr val="D1D5DB"/>
@@ -12852,33 +12940,7 @@
                 <a:effectLst/>
                 <a:latin typeface="Söhne"/>
               </a:rPr>
-              <a:t> Our primary target users are administrators and staff responsible for student management in educational institutions.</a:t>
-            </a:r>
-          </a:p>
-          <a:p>
-            <a:pPr algn="l">
-              <a:buFont typeface="Arial" panose="020B0604020202020204" pitchFamily="34" charset="0"/>
-              <a:buChar char="•"/>
-            </a:pPr>
-            <a:r>
-              <a:rPr lang="en-US" b="0" i="1" dirty="0">
-                <a:solidFill>
-                  <a:srgbClr val="D1D5DB"/>
-                </a:solidFill>
-                <a:effectLst/>
-                <a:latin typeface="Söhne"/>
-              </a:rPr>
-              <a:t>System Administrators:</a:t>
-            </a:r>
-            <a:r>
-              <a:rPr lang="en-US" b="0" i="0" dirty="0">
-                <a:solidFill>
-                  <a:srgbClr val="D1D5DB"/>
-                </a:solidFill>
-                <a:effectLst/>
-                <a:latin typeface="Söhne"/>
-              </a:rPr>
-              <a:t> System administrators overseeing the technical aspects of the Student Dashboard System.</a:t>
+              <a:t>Detailing the methodology employed during the development of the Online Enrollment System provides insights into the systematic approach taken to achieve project goals.</a:t>
             </a:r>
           </a:p>
         </p:txBody>
@@ -12918,118 +12980,6 @@
           <p:cNvPr id="2" name="Title 1">
             <a:extLst>
               <a:ext uri="{FF2B5EF4-FFF2-40B4-BE49-F238E27FC236}">
-                <a16:creationId xmlns:a16="http://schemas.microsoft.com/office/drawing/2014/main" id="{DF4311E3-45F1-E4B6-B423-E901C174DBF3}"/>
-              </a:ext>
-            </a:extLst>
-          </p:cNvPr>
-          <p:cNvSpPr>
-            <a:spLocks noGrp="1"/>
-          </p:cNvSpPr>
-          <p:nvPr>
-            <p:ph type="title"/>
-          </p:nvPr>
-        </p:nvSpPr>
-        <p:spPr/>
-        <p:txBody>
-          <a:bodyPr/>
-          <a:lstStyle/>
-          <a:p>
-            <a:r>
-              <a:rPr lang="en-US" dirty="0"/>
-              <a:t>PROBLEM</a:t>
-            </a:r>
-          </a:p>
-        </p:txBody>
-      </p:sp>
-      <p:sp>
-        <p:nvSpPr>
-          <p:cNvPr id="3" name="Content Placeholder 2">
-            <a:extLst>
-              <a:ext uri="{FF2B5EF4-FFF2-40B4-BE49-F238E27FC236}">
-                <a16:creationId xmlns:a16="http://schemas.microsoft.com/office/drawing/2014/main" id="{04B31783-A5B2-84EB-48E8-8531AF70C409}"/>
-              </a:ext>
-            </a:extLst>
-          </p:cNvPr>
-          <p:cNvSpPr>
-            <a:spLocks noGrp="1"/>
-          </p:cNvSpPr>
-          <p:nvPr>
-            <p:ph idx="1"/>
-          </p:nvPr>
-        </p:nvSpPr>
-        <p:spPr/>
-        <p:txBody>
-          <a:bodyPr/>
-          <a:lstStyle/>
-          <a:p>
-            <a:pPr algn="l">
-              <a:buFont typeface="Arial" panose="020B0604020202020204" pitchFamily="34" charset="0"/>
-              <a:buChar char="•"/>
-            </a:pPr>
-            <a:r>
-              <a:rPr lang="en-US" b="0" i="0" dirty="0">
-                <a:solidFill>
-                  <a:srgbClr val="D1D5DB"/>
-                </a:solidFill>
-                <a:effectLst/>
-                <a:latin typeface="Söhne"/>
-              </a:rPr>
-              <a:t>Currently, student management processes are prone to inefficiencies and manual errors.</a:t>
-            </a:r>
-          </a:p>
-          <a:p>
-            <a:pPr algn="l">
-              <a:buFont typeface="Arial" panose="020B0604020202020204" pitchFamily="34" charset="0"/>
-              <a:buChar char="•"/>
-            </a:pPr>
-            <a:r>
-              <a:rPr lang="en-US" b="0" i="0" dirty="0">
-                <a:solidFill>
-                  <a:srgbClr val="D1D5DB"/>
-                </a:solidFill>
-                <a:effectLst/>
-                <a:latin typeface="Söhne"/>
-              </a:rPr>
-              <a:t>Challenges in tracking and organizing student data can lead to delays and inaccuracies in administration tasks.</a:t>
-            </a:r>
-          </a:p>
-        </p:txBody>
-      </p:sp>
-    </p:spTree>
-    <p:extLst>
-      <p:ext uri="{BB962C8B-B14F-4D97-AF65-F5344CB8AC3E}">
-        <p14:creationId xmlns:p14="http://schemas.microsoft.com/office/powerpoint/2010/main" val="4096848340"/>
-      </p:ext>
-    </p:extLst>
-  </p:cSld>
-  <p:clrMapOvr>
-    <a:masterClrMapping/>
-  </p:clrMapOvr>
-</p:sld>
-</file>
-
-<file path=ppt/slides/slide7.xml><?xml version="1.0" encoding="utf-8"?>
-<p:sld xmlns:a="http://schemas.openxmlformats.org/drawingml/2006/main" xmlns:r="http://schemas.openxmlformats.org/officeDocument/2006/relationships" xmlns:p="http://schemas.openxmlformats.org/presentationml/2006/main">
-  <p:cSld>
-    <p:spTree>
-      <p:nvGrpSpPr>
-        <p:cNvPr id="1" name=""/>
-        <p:cNvGrpSpPr/>
-        <p:nvPr/>
-      </p:nvGrpSpPr>
-      <p:grpSpPr>
-        <a:xfrm>
-          <a:off x="0" y="0"/>
-          <a:ext cx="0" cy="0"/>
-          <a:chOff x="0" y="0"/>
-          <a:chExt cx="0" cy="0"/>
-        </a:xfrm>
-      </p:grpSpPr>
-      <p:sp>
-        <p:nvSpPr>
-          <p:cNvPr id="2" name="Title 1">
-            <a:extLst>
-              <a:ext uri="{FF2B5EF4-FFF2-40B4-BE49-F238E27FC236}">
                 <a16:creationId xmlns:a16="http://schemas.microsoft.com/office/drawing/2014/main" id="{E826D9B5-F043-F102-B720-587AA0CC1352}"/>
               </a:ext>
             </a:extLst>
@@ -13101,73 +13051,7 @@
 </p:sld>
 </file>
 
-<file path=ppt/slides/slide8.xml><?xml version="1.0" encoding="utf-8"?>
-<p:sld xmlns:a="http://schemas.openxmlformats.org/drawingml/2006/main" xmlns:r="http://schemas.openxmlformats.org/officeDocument/2006/relationships" xmlns:p="http://schemas.openxmlformats.org/presentationml/2006/main">
-  <p:cSld>
-    <p:spTree>
-      <p:nvGrpSpPr>
-        <p:cNvPr id="1" name=""/>
-        <p:cNvGrpSpPr/>
-        <p:nvPr/>
-      </p:nvGrpSpPr>
-      <p:grpSpPr>
-        <a:xfrm>
-          <a:off x="0" y="0"/>
-          <a:ext cx="0" cy="0"/>
-          <a:chOff x="0" y="0"/>
-          <a:chExt cx="0" cy="0"/>
-        </a:xfrm>
-      </p:grpSpPr>
-      <p:pic>
-        <p:nvPicPr>
-          <p:cNvPr id="5" name="Picture 4">
-            <a:extLst>
-              <a:ext uri="{FF2B5EF4-FFF2-40B4-BE49-F238E27FC236}">
-                <a16:creationId xmlns:a16="http://schemas.microsoft.com/office/drawing/2014/main" id="{E342F89F-B8F5-B6CD-283C-F158AF63F204}"/>
-              </a:ext>
-            </a:extLst>
-          </p:cNvPr>
-          <p:cNvPicPr>
-            <a:picLocks noChangeAspect="1"/>
-          </p:cNvPicPr>
-          <p:nvPr/>
-        </p:nvPicPr>
-        <p:blipFill>
-          <a:blip r:embed="rId2">
-            <a:extLst>
-              <a:ext uri="{28A0092B-C50C-407E-A947-70E740481C1C}">
-                <a14:useLocalDpi xmlns:a14="http://schemas.microsoft.com/office/drawing/2010/main" val="0"/>
-              </a:ext>
-            </a:extLst>
-          </a:blip>
-          <a:stretch>
-            <a:fillRect/>
-          </a:stretch>
-        </p:blipFill>
-        <p:spPr>
-          <a:xfrm>
-            <a:off x="2849455" y="420618"/>
-            <a:ext cx="6493090" cy="6016763"/>
-          </a:xfrm>
-          <a:prstGeom prst="rect">
-            <a:avLst/>
-          </a:prstGeom>
-        </p:spPr>
-      </p:pic>
-    </p:spTree>
-    <p:extLst>
-      <p:ext uri="{BB962C8B-B14F-4D97-AF65-F5344CB8AC3E}">
-        <p14:creationId xmlns:p14="http://schemas.microsoft.com/office/powerpoint/2010/main" val="1085386480"/>
-      </p:ext>
-    </p:extLst>
-  </p:cSld>
-  <p:clrMapOvr>
-    <a:masterClrMapping/>
-  </p:clrMapOvr>
-</p:sld>
-</file>
-
-<file path=ppt/slides/slide9.xml><?xml version="1.0" encoding="utf-8"?>
+<file path=ppt/slides/slide7.xml><?xml version="1.0" encoding="utf-8"?>
 <p:sld xmlns:a="http://schemas.openxmlformats.org/drawingml/2006/main" xmlns:r="http://schemas.openxmlformats.org/officeDocument/2006/relationships" xmlns:p="http://schemas.openxmlformats.org/presentationml/2006/main">
   <p:cSld>
     <p:spTree>
@@ -13207,7 +13091,7 @@
           <a:p>
             <a:r>
               <a:rPr lang="en-US" dirty="0"/>
-              <a:t>THANK YOU!!</a:t>
+              <a:t>THANK YOU!</a:t>
             </a:r>
           </a:p>
         </p:txBody>
@@ -13239,8 +13123,37 @@
                   <a:schemeClr val="tx2"/>
                 </a:solidFill>
               </a:rPr>
-              <a:t>RENZ SAYAMAN – WD89P</a:t>
+              <a:t>Wd89p - </a:t>
             </a:r>
+            <a:r>
+              <a:rPr lang="en-US" dirty="0" err="1">
+                <a:solidFill>
+                  <a:schemeClr val="tx2"/>
+                </a:solidFill>
+              </a:rPr>
+              <a:t>renz</a:t>
+            </a:r>
+            <a:r>
+              <a:rPr lang="en-US" dirty="0">
+                <a:solidFill>
+                  <a:schemeClr val="tx2"/>
+                </a:solidFill>
+              </a:rPr>
+              <a:t> </a:t>
+            </a:r>
+            <a:r>
+              <a:rPr lang="en-US" dirty="0" err="1">
+                <a:solidFill>
+                  <a:schemeClr val="tx2"/>
+                </a:solidFill>
+              </a:rPr>
+              <a:t>sayaman</a:t>
+            </a:r>
+            <a:endParaRPr lang="en-US" dirty="0">
+              <a:solidFill>
+                <a:schemeClr val="tx2"/>
+              </a:solidFill>
+            </a:endParaRPr>
           </a:p>
         </p:txBody>
       </p:sp>

</xml_diff>